<commit_message>
Final presentation in PDF
</commit_message>
<xml_diff>
--- a/docs/MarkerlessAR_FinalDemo.pptx
+++ b/docs/MarkerlessAR_FinalDemo.pptx
@@ -14,9 +14,9 @@
     <p:sldId id="298" r:id="rId5"/>
     <p:sldId id="302" r:id="rId6"/>
     <p:sldId id="299" r:id="rId7"/>
-    <p:sldId id="304" r:id="rId8"/>
-    <p:sldId id="305" r:id="rId9"/>
-    <p:sldId id="308" r:id="rId10"/>
+    <p:sldId id="308" r:id="rId8"/>
+    <p:sldId id="304" r:id="rId9"/>
+    <p:sldId id="305" r:id="rId10"/>
     <p:sldId id="306" r:id="rId11"/>
   </p:sldIdLst>
   <p:sldSz cx="9144000" cy="6858000" type="screen4x3"/>
@@ -4429,12 +4429,9 @@
                 <a:latin typeface="Times New Roman" panose="02020603050405020304" pitchFamily="18" charset="0"/>
                 <a:cs typeface="Times New Roman" panose="02020603050405020304" pitchFamily="18" charset="0"/>
               </a:rPr>
-              <a:t>Output of Jet Fighter </a:t>
-            </a:r>
-            <a:endParaRPr lang="de-DE" sz="2400" dirty="0">
-              <a:latin typeface="Times New Roman" panose="02020603050405020304" pitchFamily="18" charset="0"/>
-              <a:cs typeface="Times New Roman" panose="02020603050405020304" pitchFamily="18" charset="0"/>
-            </a:endParaRPr>
+              <a:t>Output of Feature Detection</a:t>
+            </a:r>
+            <a:endParaRPr lang="de-DE" dirty="0"/>
           </a:p>
         </p:txBody>
       </p:sp>
@@ -4461,295 +4458,6 @@
               <a:rPr lang="de-DE" smtClean="0"/>
               <a:pPr/>
               <a:t>6</a:t>
-            </a:fld>
-            <a:endParaRPr lang="de-DE" sz="1400"/>
-          </a:p>
-        </p:txBody>
-      </p:sp>
-      <p:pic>
-        <p:nvPicPr>
-          <p:cNvPr id="5" name="Picture 4"/>
-          <p:cNvPicPr>
-            <a:picLocks noChangeAspect="1"/>
-          </p:cNvPicPr>
-          <p:nvPr/>
-        </p:nvPicPr>
-        <p:blipFill>
-          <a:blip r:embed="rId2"/>
-          <a:stretch>
-            <a:fillRect/>
-          </a:stretch>
-        </p:blipFill>
-        <p:spPr>
-          <a:xfrm>
-            <a:off x="1943100" y="3164067"/>
-            <a:ext cx="5334000" cy="2876550"/>
-          </a:xfrm>
-          <a:prstGeom prst="rect">
-            <a:avLst/>
-          </a:prstGeom>
-        </p:spPr>
-      </p:pic>
-    </p:spTree>
-    <p:extLst>
-      <p:ext uri="{BB962C8B-B14F-4D97-AF65-F5344CB8AC3E}">
-        <p14:creationId xmlns:p14="http://schemas.microsoft.com/office/powerpoint/2010/main" val="4063952005"/>
-      </p:ext>
-    </p:extLst>
-  </p:cSld>
-  <p:clrMapOvr>
-    <a:masterClrMapping/>
-  </p:clrMapOvr>
-</p:sld>
-</file>
-
-<file path=ppt/slides/slide8.xml><?xml version="1.0" encoding="utf-8"?>
-<p:sld xmlns:a="http://schemas.openxmlformats.org/drawingml/2006/main" xmlns:r="http://schemas.openxmlformats.org/officeDocument/2006/relationships" xmlns:p="http://schemas.openxmlformats.org/presentationml/2006/main">
-  <p:cSld>
-    <p:spTree>
-      <p:nvGrpSpPr>
-        <p:cNvPr id="1" name=""/>
-        <p:cNvGrpSpPr/>
-        <p:nvPr/>
-      </p:nvGrpSpPr>
-      <p:grpSpPr>
-        <a:xfrm>
-          <a:off x="0" y="0"/>
-          <a:ext cx="0" cy="0"/>
-          <a:chOff x="0" y="0"/>
-          <a:chExt cx="0" cy="0"/>
-        </a:xfrm>
-      </p:grpSpPr>
-      <p:sp>
-        <p:nvSpPr>
-          <p:cNvPr id="2" name="Title 1"/>
-          <p:cNvSpPr>
-            <a:spLocks noGrp="1"/>
-          </p:cNvSpPr>
-          <p:nvPr>
-            <p:ph type="title"/>
-          </p:nvPr>
-        </p:nvSpPr>
-        <p:spPr/>
-        <p:txBody>
-          <a:bodyPr/>
-          <a:lstStyle/>
-          <a:p>
-            <a:r>
-              <a:rPr lang="en-US" sz="3200" b="1" dirty="0">
-                <a:latin typeface="Times New Roman" panose="02020603050405020304" pitchFamily="18" charset="0"/>
-                <a:cs typeface="Times New Roman" panose="02020603050405020304" pitchFamily="18" charset="0"/>
-              </a:rPr>
-              <a:t>Client Apps</a:t>
-            </a:r>
-            <a:endParaRPr lang="de-DE" sz="3200" b="1" dirty="0">
-              <a:latin typeface="Times New Roman" panose="02020603050405020304" pitchFamily="18" charset="0"/>
-              <a:cs typeface="Times New Roman" panose="02020603050405020304" pitchFamily="18" charset="0"/>
-            </a:endParaRPr>
-          </a:p>
-        </p:txBody>
-      </p:sp>
-      <p:sp>
-        <p:nvSpPr>
-          <p:cNvPr id="3" name="Content Placeholder 2"/>
-          <p:cNvSpPr>
-            <a:spLocks noGrp="1"/>
-          </p:cNvSpPr>
-          <p:nvPr>
-            <p:ph idx="1"/>
-          </p:nvPr>
-        </p:nvSpPr>
-        <p:spPr/>
-        <p:txBody>
-          <a:bodyPr/>
-          <a:lstStyle/>
-          <a:p>
-            <a:pPr marL="0" indent="0">
-              <a:buNone/>
-            </a:pPr>
-            <a:r>
-              <a:rPr lang="en-US" sz="2400" dirty="0">
-                <a:latin typeface="Times New Roman" panose="02020603050405020304" pitchFamily="18" charset="0"/>
-                <a:cs typeface="Times New Roman" panose="02020603050405020304" pitchFamily="18" charset="0"/>
-              </a:rPr>
-              <a:t>Output of 3D Augmentation Overlay</a:t>
-            </a:r>
-          </a:p>
-          <a:p>
-            <a:endParaRPr lang="de-DE" dirty="0"/>
-          </a:p>
-        </p:txBody>
-      </p:sp>
-      <p:sp>
-        <p:nvSpPr>
-          <p:cNvPr id="4" name="Slide Number Placeholder 3"/>
-          <p:cNvSpPr>
-            <a:spLocks noGrp="1"/>
-          </p:cNvSpPr>
-          <p:nvPr>
-            <p:ph type="sldNum" sz="quarter" idx="10"/>
-          </p:nvPr>
-        </p:nvSpPr>
-        <p:spPr/>
-        <p:txBody>
-          <a:bodyPr/>
-          <a:lstStyle/>
-          <a:p>
-            <a:r>
-              <a:rPr lang="de-DE"/>
-              <a:t>Seite </a:t>
-            </a:r>
-            <a:fld id="{4AEBADC7-4A78-4A5F-BE89-B1BF7900E49E}" type="slidenum">
-              <a:rPr lang="de-DE" smtClean="0"/>
-              <a:pPr/>
-              <a:t>7</a:t>
-            </a:fld>
-            <a:endParaRPr lang="de-DE" sz="1400"/>
-          </a:p>
-        </p:txBody>
-      </p:sp>
-      <p:pic>
-        <p:nvPicPr>
-          <p:cNvPr id="5" name="Content Placeholder 4"/>
-          <p:cNvPicPr>
-            <a:picLocks noChangeAspect="1"/>
-          </p:cNvPicPr>
-          <p:nvPr/>
-        </p:nvPicPr>
-        <p:blipFill>
-          <a:blip r:embed="rId2"/>
-          <a:stretch>
-            <a:fillRect/>
-          </a:stretch>
-        </p:blipFill>
-        <p:spPr bwMode="auto">
-          <a:xfrm>
-            <a:off x="1909800" y="3350803"/>
-            <a:ext cx="5400600" cy="2896515"/>
-          </a:xfrm>
-          <a:prstGeom prst="rect">
-            <a:avLst/>
-          </a:prstGeom>
-          <a:noFill/>
-          <a:ln w="9525">
-            <a:noFill/>
-            <a:miter lim="800000"/>
-            <a:headEnd/>
-            <a:tailEnd/>
-          </a:ln>
-        </p:spPr>
-      </p:pic>
-    </p:spTree>
-    <p:extLst>
-      <p:ext uri="{BB962C8B-B14F-4D97-AF65-F5344CB8AC3E}">
-        <p14:creationId xmlns:p14="http://schemas.microsoft.com/office/powerpoint/2010/main" val="3658483736"/>
-      </p:ext>
-    </p:extLst>
-  </p:cSld>
-  <p:clrMapOvr>
-    <a:masterClrMapping/>
-  </p:clrMapOvr>
-</p:sld>
-</file>
-
-<file path=ppt/slides/slide9.xml><?xml version="1.0" encoding="utf-8"?>
-<p:sld xmlns:a="http://schemas.openxmlformats.org/drawingml/2006/main" xmlns:r="http://schemas.openxmlformats.org/officeDocument/2006/relationships" xmlns:p="http://schemas.openxmlformats.org/presentationml/2006/main">
-  <p:cSld>
-    <p:spTree>
-      <p:nvGrpSpPr>
-        <p:cNvPr id="1" name=""/>
-        <p:cNvGrpSpPr/>
-        <p:nvPr/>
-      </p:nvGrpSpPr>
-      <p:grpSpPr>
-        <a:xfrm>
-          <a:off x="0" y="0"/>
-          <a:ext cx="0" cy="0"/>
-          <a:chOff x="0" y="0"/>
-          <a:chExt cx="0" cy="0"/>
-        </a:xfrm>
-      </p:grpSpPr>
-      <p:sp>
-        <p:nvSpPr>
-          <p:cNvPr id="2" name="Title 1"/>
-          <p:cNvSpPr>
-            <a:spLocks noGrp="1"/>
-          </p:cNvSpPr>
-          <p:nvPr>
-            <p:ph type="title"/>
-          </p:nvPr>
-        </p:nvSpPr>
-        <p:spPr/>
-        <p:txBody>
-          <a:bodyPr/>
-          <a:lstStyle/>
-          <a:p>
-            <a:r>
-              <a:rPr lang="en-US" sz="3200" b="1" dirty="0">
-                <a:latin typeface="Times New Roman" panose="02020603050405020304" pitchFamily="18" charset="0"/>
-                <a:cs typeface="Times New Roman" panose="02020603050405020304" pitchFamily="18" charset="0"/>
-              </a:rPr>
-              <a:t>Client Apps</a:t>
-            </a:r>
-            <a:endParaRPr lang="de-DE" sz="3200" b="1" dirty="0">
-              <a:latin typeface="Times New Roman" panose="02020603050405020304" pitchFamily="18" charset="0"/>
-              <a:cs typeface="Times New Roman" panose="02020603050405020304" pitchFamily="18" charset="0"/>
-            </a:endParaRPr>
-          </a:p>
-        </p:txBody>
-      </p:sp>
-      <p:sp>
-        <p:nvSpPr>
-          <p:cNvPr id="3" name="Content Placeholder 2"/>
-          <p:cNvSpPr>
-            <a:spLocks noGrp="1"/>
-          </p:cNvSpPr>
-          <p:nvPr>
-            <p:ph idx="1"/>
-          </p:nvPr>
-        </p:nvSpPr>
-        <p:spPr/>
-        <p:txBody>
-          <a:bodyPr/>
-          <a:lstStyle/>
-          <a:p>
-            <a:pPr marL="0" indent="0">
-              <a:buNone/>
-            </a:pPr>
-            <a:r>
-              <a:rPr lang="en-US" sz="2400" dirty="0">
-                <a:latin typeface="Times New Roman" panose="02020603050405020304" pitchFamily="18" charset="0"/>
-                <a:cs typeface="Times New Roman" panose="02020603050405020304" pitchFamily="18" charset="0"/>
-              </a:rPr>
-              <a:t>Output of Feature Detection</a:t>
-            </a:r>
-            <a:endParaRPr lang="de-DE" dirty="0"/>
-          </a:p>
-        </p:txBody>
-      </p:sp>
-      <p:sp>
-        <p:nvSpPr>
-          <p:cNvPr id="4" name="Slide Number Placeholder 3"/>
-          <p:cNvSpPr>
-            <a:spLocks noGrp="1"/>
-          </p:cNvSpPr>
-          <p:nvPr>
-            <p:ph type="sldNum" sz="quarter" idx="10"/>
-          </p:nvPr>
-        </p:nvSpPr>
-        <p:spPr/>
-        <p:txBody>
-          <a:bodyPr/>
-          <a:lstStyle/>
-          <a:p>
-            <a:r>
-              <a:rPr lang="de-DE"/>
-              <a:t>Seite </a:t>
-            </a:r>
-            <a:fld id="{4AEBADC7-4A78-4A5F-BE89-B1BF7900E49E}" type="slidenum">
-              <a:rPr lang="de-DE" smtClean="0"/>
-              <a:pPr/>
-              <a:t>8</a:t>
             </a:fld>
             <a:endParaRPr lang="de-DE" sz="1400"/>
           </a:p>
@@ -4800,6 +4508,298 @@
     <p:extLst>
       <p:ext uri="{BB962C8B-B14F-4D97-AF65-F5344CB8AC3E}">
         <p14:creationId xmlns:p14="http://schemas.microsoft.com/office/powerpoint/2010/main" val="590129159"/>
+      </p:ext>
+    </p:extLst>
+  </p:cSld>
+  <p:clrMapOvr>
+    <a:masterClrMapping/>
+  </p:clrMapOvr>
+</p:sld>
+</file>
+
+<file path=ppt/slides/slide8.xml><?xml version="1.0" encoding="utf-8"?>
+<p:sld xmlns:a="http://schemas.openxmlformats.org/drawingml/2006/main" xmlns:r="http://schemas.openxmlformats.org/officeDocument/2006/relationships" xmlns:p="http://schemas.openxmlformats.org/presentationml/2006/main">
+  <p:cSld>
+    <p:spTree>
+      <p:nvGrpSpPr>
+        <p:cNvPr id="1" name=""/>
+        <p:cNvGrpSpPr/>
+        <p:nvPr/>
+      </p:nvGrpSpPr>
+      <p:grpSpPr>
+        <a:xfrm>
+          <a:off x="0" y="0"/>
+          <a:ext cx="0" cy="0"/>
+          <a:chOff x="0" y="0"/>
+          <a:chExt cx="0" cy="0"/>
+        </a:xfrm>
+      </p:grpSpPr>
+      <p:sp>
+        <p:nvSpPr>
+          <p:cNvPr id="2" name="Title 1"/>
+          <p:cNvSpPr>
+            <a:spLocks noGrp="1"/>
+          </p:cNvSpPr>
+          <p:nvPr>
+            <p:ph type="title"/>
+          </p:nvPr>
+        </p:nvSpPr>
+        <p:spPr/>
+        <p:txBody>
+          <a:bodyPr/>
+          <a:lstStyle/>
+          <a:p>
+            <a:r>
+              <a:rPr lang="en-US" sz="3200" b="1" dirty="0">
+                <a:latin typeface="Times New Roman" panose="02020603050405020304" pitchFamily="18" charset="0"/>
+                <a:cs typeface="Times New Roman" panose="02020603050405020304" pitchFamily="18" charset="0"/>
+              </a:rPr>
+              <a:t>Client Apps</a:t>
+            </a:r>
+            <a:endParaRPr lang="de-DE" sz="3200" b="1" dirty="0">
+              <a:latin typeface="Times New Roman" panose="02020603050405020304" pitchFamily="18" charset="0"/>
+              <a:cs typeface="Times New Roman" panose="02020603050405020304" pitchFamily="18" charset="0"/>
+            </a:endParaRPr>
+          </a:p>
+        </p:txBody>
+      </p:sp>
+      <p:sp>
+        <p:nvSpPr>
+          <p:cNvPr id="3" name="Content Placeholder 2"/>
+          <p:cNvSpPr>
+            <a:spLocks noGrp="1"/>
+          </p:cNvSpPr>
+          <p:nvPr>
+            <p:ph idx="1"/>
+          </p:nvPr>
+        </p:nvSpPr>
+        <p:spPr/>
+        <p:txBody>
+          <a:bodyPr/>
+          <a:lstStyle/>
+          <a:p>
+            <a:pPr marL="0" indent="0">
+              <a:buNone/>
+            </a:pPr>
+            <a:r>
+              <a:rPr lang="en-US" sz="2400" dirty="0">
+                <a:latin typeface="Times New Roman" panose="02020603050405020304" pitchFamily="18" charset="0"/>
+                <a:cs typeface="Times New Roman" panose="02020603050405020304" pitchFamily="18" charset="0"/>
+              </a:rPr>
+              <a:t>Output of Jet Fighter </a:t>
+            </a:r>
+            <a:endParaRPr lang="de-DE" sz="2400" dirty="0">
+              <a:latin typeface="Times New Roman" panose="02020603050405020304" pitchFamily="18" charset="0"/>
+              <a:cs typeface="Times New Roman" panose="02020603050405020304" pitchFamily="18" charset="0"/>
+            </a:endParaRPr>
+          </a:p>
+        </p:txBody>
+      </p:sp>
+      <p:sp>
+        <p:nvSpPr>
+          <p:cNvPr id="4" name="Slide Number Placeholder 3"/>
+          <p:cNvSpPr>
+            <a:spLocks noGrp="1"/>
+          </p:cNvSpPr>
+          <p:nvPr>
+            <p:ph type="sldNum" sz="quarter" idx="10"/>
+          </p:nvPr>
+        </p:nvSpPr>
+        <p:spPr/>
+        <p:txBody>
+          <a:bodyPr/>
+          <a:lstStyle/>
+          <a:p>
+            <a:r>
+              <a:rPr lang="de-DE"/>
+              <a:t>Seite </a:t>
+            </a:r>
+            <a:fld id="{4AEBADC7-4A78-4A5F-BE89-B1BF7900E49E}" type="slidenum">
+              <a:rPr lang="de-DE" smtClean="0"/>
+              <a:pPr/>
+              <a:t>7</a:t>
+            </a:fld>
+            <a:endParaRPr lang="de-DE" sz="1400"/>
+          </a:p>
+        </p:txBody>
+      </p:sp>
+      <p:pic>
+        <p:nvPicPr>
+          <p:cNvPr id="5" name="Picture 4"/>
+          <p:cNvPicPr>
+            <a:picLocks noChangeAspect="1"/>
+          </p:cNvPicPr>
+          <p:nvPr/>
+        </p:nvPicPr>
+        <p:blipFill>
+          <a:blip r:embed="rId2"/>
+          <a:stretch>
+            <a:fillRect/>
+          </a:stretch>
+        </p:blipFill>
+        <p:spPr>
+          <a:xfrm>
+            <a:off x="1943100" y="3164067"/>
+            <a:ext cx="5334000" cy="2876550"/>
+          </a:xfrm>
+          <a:prstGeom prst="rect">
+            <a:avLst/>
+          </a:prstGeom>
+        </p:spPr>
+      </p:pic>
+    </p:spTree>
+    <p:extLst>
+      <p:ext uri="{BB962C8B-B14F-4D97-AF65-F5344CB8AC3E}">
+        <p14:creationId xmlns:p14="http://schemas.microsoft.com/office/powerpoint/2010/main" val="4063952005"/>
+      </p:ext>
+    </p:extLst>
+  </p:cSld>
+  <p:clrMapOvr>
+    <a:masterClrMapping/>
+  </p:clrMapOvr>
+</p:sld>
+</file>
+
+<file path=ppt/slides/slide9.xml><?xml version="1.0" encoding="utf-8"?>
+<p:sld xmlns:a="http://schemas.openxmlformats.org/drawingml/2006/main" xmlns:r="http://schemas.openxmlformats.org/officeDocument/2006/relationships" xmlns:p="http://schemas.openxmlformats.org/presentationml/2006/main">
+  <p:cSld>
+    <p:spTree>
+      <p:nvGrpSpPr>
+        <p:cNvPr id="1" name=""/>
+        <p:cNvGrpSpPr/>
+        <p:nvPr/>
+      </p:nvGrpSpPr>
+      <p:grpSpPr>
+        <a:xfrm>
+          <a:off x="0" y="0"/>
+          <a:ext cx="0" cy="0"/>
+          <a:chOff x="0" y="0"/>
+          <a:chExt cx="0" cy="0"/>
+        </a:xfrm>
+      </p:grpSpPr>
+      <p:sp>
+        <p:nvSpPr>
+          <p:cNvPr id="2" name="Title 1"/>
+          <p:cNvSpPr>
+            <a:spLocks noGrp="1"/>
+          </p:cNvSpPr>
+          <p:nvPr>
+            <p:ph type="title"/>
+          </p:nvPr>
+        </p:nvSpPr>
+        <p:spPr/>
+        <p:txBody>
+          <a:bodyPr/>
+          <a:lstStyle/>
+          <a:p>
+            <a:r>
+              <a:rPr lang="en-US" sz="3200" b="1" dirty="0">
+                <a:latin typeface="Times New Roman" panose="02020603050405020304" pitchFamily="18" charset="0"/>
+                <a:cs typeface="Times New Roman" panose="02020603050405020304" pitchFamily="18" charset="0"/>
+              </a:rPr>
+              <a:t>Client Apps</a:t>
+            </a:r>
+            <a:endParaRPr lang="de-DE" sz="3200" b="1" dirty="0">
+              <a:latin typeface="Times New Roman" panose="02020603050405020304" pitchFamily="18" charset="0"/>
+              <a:cs typeface="Times New Roman" panose="02020603050405020304" pitchFamily="18" charset="0"/>
+            </a:endParaRPr>
+          </a:p>
+        </p:txBody>
+      </p:sp>
+      <p:sp>
+        <p:nvSpPr>
+          <p:cNvPr id="3" name="Content Placeholder 2"/>
+          <p:cNvSpPr>
+            <a:spLocks noGrp="1"/>
+          </p:cNvSpPr>
+          <p:nvPr>
+            <p:ph idx="1"/>
+          </p:nvPr>
+        </p:nvSpPr>
+        <p:spPr/>
+        <p:txBody>
+          <a:bodyPr/>
+          <a:lstStyle/>
+          <a:p>
+            <a:pPr marL="0" indent="0">
+              <a:buNone/>
+            </a:pPr>
+            <a:r>
+              <a:rPr lang="en-US" sz="2400" dirty="0">
+                <a:latin typeface="Times New Roman" panose="02020603050405020304" pitchFamily="18" charset="0"/>
+                <a:cs typeface="Times New Roman" panose="02020603050405020304" pitchFamily="18" charset="0"/>
+              </a:rPr>
+              <a:t>Output of 3D Augmentation Overlay</a:t>
+            </a:r>
+          </a:p>
+          <a:p>
+            <a:endParaRPr lang="de-DE" dirty="0"/>
+          </a:p>
+        </p:txBody>
+      </p:sp>
+      <p:sp>
+        <p:nvSpPr>
+          <p:cNvPr id="4" name="Slide Number Placeholder 3"/>
+          <p:cNvSpPr>
+            <a:spLocks noGrp="1"/>
+          </p:cNvSpPr>
+          <p:nvPr>
+            <p:ph type="sldNum" sz="quarter" idx="10"/>
+          </p:nvPr>
+        </p:nvSpPr>
+        <p:spPr/>
+        <p:txBody>
+          <a:bodyPr/>
+          <a:lstStyle/>
+          <a:p>
+            <a:r>
+              <a:rPr lang="de-DE"/>
+              <a:t>Seite </a:t>
+            </a:r>
+            <a:fld id="{4AEBADC7-4A78-4A5F-BE89-B1BF7900E49E}" type="slidenum">
+              <a:rPr lang="de-DE" smtClean="0"/>
+              <a:pPr/>
+              <a:t>8</a:t>
+            </a:fld>
+            <a:endParaRPr lang="de-DE" sz="1400"/>
+          </a:p>
+        </p:txBody>
+      </p:sp>
+      <p:pic>
+        <p:nvPicPr>
+          <p:cNvPr id="5" name="Content Placeholder 4"/>
+          <p:cNvPicPr>
+            <a:picLocks noChangeAspect="1"/>
+          </p:cNvPicPr>
+          <p:nvPr/>
+        </p:nvPicPr>
+        <p:blipFill>
+          <a:blip r:embed="rId2"/>
+          <a:stretch>
+            <a:fillRect/>
+          </a:stretch>
+        </p:blipFill>
+        <p:spPr bwMode="auto">
+          <a:xfrm>
+            <a:off x="1909800" y="3350803"/>
+            <a:ext cx="5400600" cy="2896515"/>
+          </a:xfrm>
+          <a:prstGeom prst="rect">
+            <a:avLst/>
+          </a:prstGeom>
+          <a:noFill/>
+          <a:ln w="9525">
+            <a:noFill/>
+            <a:miter lim="800000"/>
+            <a:headEnd/>
+            <a:tailEnd/>
+          </a:ln>
+        </p:spPr>
+      </p:pic>
+    </p:spTree>
+    <p:extLst>
+      <p:ext uri="{BB962C8B-B14F-4D97-AF65-F5344CB8AC3E}">
+        <p14:creationId xmlns:p14="http://schemas.microsoft.com/office/powerpoint/2010/main" val="3658483736"/>
       </p:ext>
     </p:extLst>
   </p:cSld>

</xml_diff>